<commit_message>
commit_website_files | Github Action Build 3e2f54ad56b95fd75f4ac254812ea9b6ab5aea87
</commit_message>
<xml_diff>
--- a/files/powerplatform/logo.pptx
+++ b/files/powerplatform/logo.pptx
@@ -105,6 +105,11 @@
       </a:defRPr>
     </a:lvl9pPr>
   </p:defaultTextStyle>
+  <p:extLst>
+    <p:ext uri="{EFAFB233-063F-42B5-8137-9DF3F51BA10A}">
+      <p15:sldGuideLst xmlns:p15="http://schemas.microsoft.com/office/powerpoint/2012/main"/>
+    </p:ext>
+  </p:extLst>
 </p:presentation>
 </file>
 
@@ -3333,7 +3338,7 @@
           <a:p>
             <a:fld id="{4B7CF828-5537-4DFD-B492-1ED3E101748E}" type="datetimeFigureOut">
               <a:rPr lang="nl-NL" smtClean="0"/>
-              <a:t>24-9-2020</a:t>
+              <a:t>25-9-2020</a:t>
             </a:fld>
             <a:endParaRPr lang="nl-NL"/>
           </a:p>
@@ -3503,7 +3508,7 @@
           <a:p>
             <a:fld id="{4B7CF828-5537-4DFD-B492-1ED3E101748E}" type="datetimeFigureOut">
               <a:rPr lang="nl-NL" smtClean="0"/>
-              <a:t>24-9-2020</a:t>
+              <a:t>25-9-2020</a:t>
             </a:fld>
             <a:endParaRPr lang="nl-NL"/>
           </a:p>
@@ -3683,7 +3688,7 @@
           <a:p>
             <a:fld id="{4B7CF828-5537-4DFD-B492-1ED3E101748E}" type="datetimeFigureOut">
               <a:rPr lang="nl-NL" smtClean="0"/>
-              <a:t>24-9-2020</a:t>
+              <a:t>25-9-2020</a:t>
             </a:fld>
             <a:endParaRPr lang="nl-NL"/>
           </a:p>
@@ -3853,7 +3858,7 @@
           <a:p>
             <a:fld id="{4B7CF828-5537-4DFD-B492-1ED3E101748E}" type="datetimeFigureOut">
               <a:rPr lang="nl-NL" smtClean="0"/>
-              <a:t>24-9-2020</a:t>
+              <a:t>25-9-2020</a:t>
             </a:fld>
             <a:endParaRPr lang="nl-NL"/>
           </a:p>
@@ -4099,7 +4104,7 @@
           <a:p>
             <a:fld id="{4B7CF828-5537-4DFD-B492-1ED3E101748E}" type="datetimeFigureOut">
               <a:rPr lang="nl-NL" smtClean="0"/>
-              <a:t>24-9-2020</a:t>
+              <a:t>25-9-2020</a:t>
             </a:fld>
             <a:endParaRPr lang="nl-NL"/>
           </a:p>
@@ -4331,7 +4336,7 @@
           <a:p>
             <a:fld id="{4B7CF828-5537-4DFD-B492-1ED3E101748E}" type="datetimeFigureOut">
               <a:rPr lang="nl-NL" smtClean="0"/>
-              <a:t>24-9-2020</a:t>
+              <a:t>25-9-2020</a:t>
             </a:fld>
             <a:endParaRPr lang="nl-NL"/>
           </a:p>
@@ -4698,7 +4703,7 @@
           <a:p>
             <a:fld id="{4B7CF828-5537-4DFD-B492-1ED3E101748E}" type="datetimeFigureOut">
               <a:rPr lang="nl-NL" smtClean="0"/>
-              <a:t>24-9-2020</a:t>
+              <a:t>25-9-2020</a:t>
             </a:fld>
             <a:endParaRPr lang="nl-NL"/>
           </a:p>
@@ -4816,7 +4821,7 @@
           <a:p>
             <a:fld id="{4B7CF828-5537-4DFD-B492-1ED3E101748E}" type="datetimeFigureOut">
               <a:rPr lang="nl-NL" smtClean="0"/>
-              <a:t>24-9-2020</a:t>
+              <a:t>25-9-2020</a:t>
             </a:fld>
             <a:endParaRPr lang="nl-NL"/>
           </a:p>
@@ -4911,7 +4916,7 @@
           <a:p>
             <a:fld id="{4B7CF828-5537-4DFD-B492-1ED3E101748E}" type="datetimeFigureOut">
               <a:rPr lang="nl-NL" smtClean="0"/>
-              <a:t>24-9-2020</a:t>
+              <a:t>25-9-2020</a:t>
             </a:fld>
             <a:endParaRPr lang="nl-NL"/>
           </a:p>
@@ -5188,7 +5193,7 @@
           <a:p>
             <a:fld id="{4B7CF828-5537-4DFD-B492-1ED3E101748E}" type="datetimeFigureOut">
               <a:rPr lang="nl-NL" smtClean="0"/>
-              <a:t>24-9-2020</a:t>
+              <a:t>25-9-2020</a:t>
             </a:fld>
             <a:endParaRPr lang="nl-NL"/>
           </a:p>
@@ -5445,7 +5450,7 @@
           <a:p>
             <a:fld id="{4B7CF828-5537-4DFD-B492-1ED3E101748E}" type="datetimeFigureOut">
               <a:rPr lang="nl-NL" smtClean="0"/>
-              <a:t>24-9-2020</a:t>
+              <a:t>25-9-2020</a:t>
             </a:fld>
             <a:endParaRPr lang="nl-NL"/>
           </a:p>
@@ -5658,7 +5663,7 @@
           <a:p>
             <a:fld id="{4B7CF828-5537-4DFD-B492-1ED3E101748E}" type="datetimeFigureOut">
               <a:rPr lang="nl-NL" smtClean="0"/>
-              <a:t>24-9-2020</a:t>
+              <a:t>25-9-2020</a:t>
             </a:fld>
             <a:endParaRPr lang="nl-NL"/>
           </a:p>
@@ -6827,6 +6832,15 @@
         <p:blipFill>
           <a:blip r:embed="rId2">
             <a:extLst>
+              <a:ext uri="{BEBA8EAE-BF5A-486C-A8C5-ECC9F3942E4B}">
+                <a14:imgProps xmlns:a14="http://schemas.microsoft.com/office/drawing/2010/main">
+                  <a14:imgLayer r:embed="rId3">
+                    <a14:imgEffect>
+                      <a14:saturation sat="33000"/>
+                    </a14:imgEffect>
+                  </a14:imgLayer>
+                </a14:imgProps>
+              </a:ext>
               <a:ext uri="{28A0092B-C50C-407E-A947-70E740481C1C}">
                 <a14:useLocalDpi xmlns:a14="http://schemas.microsoft.com/office/drawing/2010/main" val="0"/>
               </a:ext>
@@ -6839,8 +6853,8 @@
         </p:blipFill>
         <p:spPr bwMode="auto">
           <a:xfrm>
-            <a:off x="1875775" y="1521448"/>
-            <a:ext cx="4981575" cy="914400"/>
+            <a:off x="4142783" y="1864861"/>
+            <a:ext cx="3151445" cy="578468"/>
           </a:xfrm>
           <a:prstGeom prst="rect">
             <a:avLst/>
@@ -6872,7 +6886,275 @@
           <p:nvPr/>
         </p:nvPicPr>
         <p:blipFill>
-          <a:blip r:embed="rId3">
+          <a:blip r:embed="rId4">
+            <a:extLst>
+              <a:ext uri="{BEBA8EAE-BF5A-486C-A8C5-ECC9F3942E4B}">
+                <a14:imgProps xmlns:a14="http://schemas.microsoft.com/office/drawing/2010/main">
+                  <a14:imgLayer r:embed="rId5">
+                    <a14:imgEffect>
+                      <a14:saturation sat="66000"/>
+                    </a14:imgEffect>
+                  </a14:imgLayer>
+                </a14:imgProps>
+              </a:ext>
+              <a:ext uri="{28A0092B-C50C-407E-A947-70E740481C1C}">
+                <a14:useLocalDpi xmlns:a14="http://schemas.microsoft.com/office/drawing/2010/main" val="0"/>
+              </a:ext>
+            </a:extLst>
+          </a:blip>
+          <a:srcRect/>
+          <a:stretch>
+            <a:fillRect/>
+          </a:stretch>
+        </p:blipFill>
+        <p:spPr bwMode="auto">
+          <a:xfrm>
+            <a:off x="8642153" y="1227249"/>
+            <a:ext cx="2492012" cy="1665855"/>
+          </a:xfrm>
+          <a:prstGeom prst="rect">
+            <a:avLst/>
+          </a:prstGeom>
+          <a:noFill/>
+          <a:extLst>
+            <a:ext uri="{909E8E84-426E-40DD-AFC4-6F175D3DCCD1}">
+              <a14:hiddenFill xmlns:a14="http://schemas.microsoft.com/office/drawing/2010/main">
+                <a:solidFill>
+                  <a:srgbClr val="FFFFFF"/>
+                </a:solidFill>
+              </a14:hiddenFill>
+            </a:ext>
+          </a:extLst>
+        </p:spPr>
+      </p:pic>
+      <p:sp>
+        <p:nvSpPr>
+          <p:cNvPr id="7" name="Pijl: rechts 6">
+            <a:extLst>
+              <a:ext uri="{FF2B5EF4-FFF2-40B4-BE49-F238E27FC236}">
+                <a16:creationId xmlns:a16="http://schemas.microsoft.com/office/drawing/2014/main" id="{DF0E43FF-0403-46CC-B183-1E92DD8C3CB9}"/>
+              </a:ext>
+            </a:extLst>
+          </p:cNvPr>
+          <p:cNvSpPr/>
+          <p:nvPr/>
+        </p:nvSpPr>
+        <p:spPr>
+          <a:xfrm>
+            <a:off x="2802639" y="1864861"/>
+            <a:ext cx="1161826" cy="650077"/>
+          </a:xfrm>
+          <a:prstGeom prst="rightArrow">
+            <a:avLst/>
+          </a:prstGeom>
+        </p:spPr>
+        <p:style>
+          <a:lnRef idx="2">
+            <a:schemeClr val="accent5">
+              <a:shade val="50000"/>
+            </a:schemeClr>
+          </a:lnRef>
+          <a:fillRef idx="1">
+            <a:schemeClr val="accent5"/>
+          </a:fillRef>
+          <a:effectRef idx="0">
+            <a:schemeClr val="accent5"/>
+          </a:effectRef>
+          <a:fontRef idx="minor">
+            <a:schemeClr val="lt1"/>
+          </a:fontRef>
+        </p:style>
+        <p:txBody>
+          <a:bodyPr rtlCol="0" anchor="ctr"/>
+          <a:lstStyle/>
+          <a:p>
+            <a:pPr algn="ctr"/>
+            <a:r>
+              <a:rPr lang="nl-NL" sz="1200" dirty="0"/>
+              <a:t>triggers</a:t>
+            </a:r>
+          </a:p>
+        </p:txBody>
+      </p:sp>
+      <p:pic>
+        <p:nvPicPr>
+          <p:cNvPr id="8" name="Graphic 7">
+            <a:extLst>
+              <a:ext uri="{FF2B5EF4-FFF2-40B4-BE49-F238E27FC236}">
+                <a16:creationId xmlns:a16="http://schemas.microsoft.com/office/drawing/2014/main" id="{66CEA13E-F5B2-4F35-979E-6ABB15E4D58A}"/>
+              </a:ext>
+            </a:extLst>
+          </p:cNvPr>
+          <p:cNvPicPr>
+            <a:picLocks noChangeAspect="1"/>
+          </p:cNvPicPr>
+          <p:nvPr/>
+        </p:nvPicPr>
+        <p:blipFill>
+          <a:blip r:embed="rId6">
+            <a:extLst>
+              <a:ext uri="{28A0092B-C50C-407E-A947-70E740481C1C}">
+                <a14:useLocalDpi xmlns:a14="http://schemas.microsoft.com/office/drawing/2010/main" val="0"/>
+              </a:ext>
+              <a:ext uri="{96DAC541-7B7A-43D3-8B79-37D633B846F1}">
+                <asvg:svgBlip xmlns:asvg="http://schemas.microsoft.com/office/drawing/2016/SVG/main" r:embed="rId7"/>
+              </a:ext>
+            </a:extLst>
+          </a:blip>
+          <a:stretch>
+            <a:fillRect/>
+          </a:stretch>
+        </p:blipFill>
+        <p:spPr>
+          <a:xfrm>
+            <a:off x="10884218" y="1682355"/>
+            <a:ext cx="806412" cy="806412"/>
+          </a:xfrm>
+          <a:prstGeom prst="rect">
+            <a:avLst/>
+          </a:prstGeom>
+        </p:spPr>
+      </p:pic>
+      <p:pic>
+        <p:nvPicPr>
+          <p:cNvPr id="10" name="Afbeelding 9">
+            <a:extLst>
+              <a:ext uri="{FF2B5EF4-FFF2-40B4-BE49-F238E27FC236}">
+                <a16:creationId xmlns:a16="http://schemas.microsoft.com/office/drawing/2014/main" id="{1BDF8C90-A191-4698-B493-5EB3FE368D7F}"/>
+              </a:ext>
+            </a:extLst>
+          </p:cNvPr>
+          <p:cNvPicPr>
+            <a:picLocks noChangeAspect="1"/>
+          </p:cNvPicPr>
+          <p:nvPr/>
+        </p:nvPicPr>
+        <p:blipFill>
+          <a:blip r:embed="rId8">
+            <a:extLst>
+              <a:ext uri="{28A0092B-C50C-407E-A947-70E740481C1C}">
+                <a14:useLocalDpi xmlns:a14="http://schemas.microsoft.com/office/drawing/2010/main" val="0"/>
+              </a:ext>
+              <a:ext uri="{837473B0-CC2E-450A-ABE3-18F120FF3D39}">
+                <a1611:picAttrSrcUrl xmlns:a1611="http://schemas.microsoft.com/office/drawing/2016/11/main" r:id="rId9"/>
+              </a:ext>
+            </a:extLst>
+          </a:blip>
+          <a:stretch>
+            <a:fillRect/>
+          </a:stretch>
+        </p:blipFill>
+        <p:spPr>
+          <a:xfrm>
+            <a:off x="2105673" y="1964795"/>
+            <a:ext cx="484094" cy="450207"/>
+          </a:xfrm>
+          <a:prstGeom prst="rect">
+            <a:avLst/>
+          </a:prstGeom>
+        </p:spPr>
+      </p:pic>
+      <p:sp>
+        <p:nvSpPr>
+          <p:cNvPr id="12" name="Tekstvak 11">
+            <a:extLst>
+              <a:ext uri="{FF2B5EF4-FFF2-40B4-BE49-F238E27FC236}">
+                <a16:creationId xmlns:a16="http://schemas.microsoft.com/office/drawing/2014/main" id="{CAC83DE5-B7B9-4E83-8BEC-1F34844CE618}"/>
+              </a:ext>
+            </a:extLst>
+          </p:cNvPr>
+          <p:cNvSpPr txBox="1"/>
+          <p:nvPr/>
+        </p:nvSpPr>
+        <p:spPr>
+          <a:xfrm>
+            <a:off x="263835" y="2708971"/>
+            <a:ext cx="2173044" cy="276999"/>
+          </a:xfrm>
+          <a:prstGeom prst="rect">
+            <a:avLst/>
+          </a:prstGeom>
+          <a:noFill/>
+        </p:spPr>
+        <p:txBody>
+          <a:bodyPr wrap="square" rtlCol="0">
+            <a:spAutoFit/>
+          </a:bodyPr>
+          <a:lstStyle/>
+          <a:p>
+            <a:r>
+              <a:rPr lang="nl-NL" sz="1200" dirty="0"/>
+              <a:t>SharePoint Document Library</a:t>
+            </a:r>
+          </a:p>
+        </p:txBody>
+      </p:sp>
+      <p:sp>
+        <p:nvSpPr>
+          <p:cNvPr id="13" name="Pijl: rechts 12">
+            <a:extLst>
+              <a:ext uri="{FF2B5EF4-FFF2-40B4-BE49-F238E27FC236}">
+                <a16:creationId xmlns:a16="http://schemas.microsoft.com/office/drawing/2014/main" id="{CF168591-1433-4A58-AB48-DED6A74AF891}"/>
+              </a:ext>
+            </a:extLst>
+          </p:cNvPr>
+          <p:cNvSpPr/>
+          <p:nvPr/>
+        </p:nvSpPr>
+        <p:spPr>
+          <a:xfrm>
+            <a:off x="7731122" y="1793252"/>
+            <a:ext cx="1161826" cy="650077"/>
+          </a:xfrm>
+          <a:prstGeom prst="rightArrow">
+            <a:avLst/>
+          </a:prstGeom>
+        </p:spPr>
+        <p:style>
+          <a:lnRef idx="2">
+            <a:schemeClr val="accent5">
+              <a:shade val="50000"/>
+            </a:schemeClr>
+          </a:lnRef>
+          <a:fillRef idx="1">
+            <a:schemeClr val="accent5"/>
+          </a:fillRef>
+          <a:effectRef idx="0">
+            <a:schemeClr val="accent5"/>
+          </a:effectRef>
+          <a:fontRef idx="minor">
+            <a:schemeClr val="lt1"/>
+          </a:fontRef>
+        </p:style>
+        <p:txBody>
+          <a:bodyPr rtlCol="0" anchor="ctr"/>
+          <a:lstStyle/>
+          <a:p>
+            <a:pPr algn="ctr"/>
+            <a:r>
+              <a:rPr lang="nl-NL" sz="1200" dirty="0" err="1"/>
+              <a:t>places</a:t>
+            </a:r>
+            <a:endParaRPr lang="nl-NL" sz="1200" dirty="0"/>
+          </a:p>
+        </p:txBody>
+      </p:sp>
+      <p:pic>
+        <p:nvPicPr>
+          <p:cNvPr id="14" name="Picture 16" descr="Wat is SharePoint?">
+            <a:extLst>
+              <a:ext uri="{FF2B5EF4-FFF2-40B4-BE49-F238E27FC236}">
+                <a16:creationId xmlns:a16="http://schemas.microsoft.com/office/drawing/2014/main" id="{82C22ECB-AB76-4FF7-95B2-F3CCB3B3F874}"/>
+              </a:ext>
+            </a:extLst>
+          </p:cNvPr>
+          <p:cNvPicPr>
+            <a:picLocks noChangeAspect="1" noChangeArrowheads="1"/>
+          </p:cNvPicPr>
+          <p:nvPr/>
+        </p:nvPicPr>
+        <p:blipFill>
+          <a:blip r:embed="rId10">
             <a:extLst>
               <a:ext uri="{28A0092B-C50C-407E-A947-70E740481C1C}">
                 <a14:useLocalDpi xmlns:a14="http://schemas.microsoft.com/office/drawing/2010/main" val="0"/>
@@ -6886,8 +7168,8 @@
         </p:blipFill>
         <p:spPr bwMode="auto">
           <a:xfrm>
-            <a:off x="3155753" y="2976868"/>
-            <a:ext cx="3084228" cy="2061739"/>
+            <a:off x="262867" y="1615802"/>
+            <a:ext cx="1865810" cy="1148191"/>
           </a:xfrm>
           <a:prstGeom prst="rect">
             <a:avLst/>

</xml_diff>